<commit_message>
update deleteBudgetSequenceDiagram in developers guide
</commit_message>
<xml_diff>
--- a/docs/diagrams/DeleteBudgetSequenceDiagram.pptx
+++ b/docs/diagrams/DeleteBudgetSequenceDiagram.pptx
@@ -208,7 +208,7 @@
           <a:p>
             <a:fld id="{F5CC4B3F-88C1-4FFA-B1B6-F41C21DC6924}" type="datetimeFigureOut">
               <a:rPr lang="en-US" smtClean="0"/>
-              <a:t>4/11/2019</a:t>
+              <a:t>4/12/2019</a:t>
             </a:fld>
             <a:endParaRPr lang="en-US"/>
           </a:p>
@@ -654,7 +654,7 @@
           <a:p>
             <a:fld id="{78C97017-6FC3-485B-9764-EAC9E56C1D49}" type="datetimeFigureOut">
               <a:rPr lang="en-US" smtClean="0"/>
-              <a:t>4/11/2019</a:t>
+              <a:t>4/12/2019</a:t>
             </a:fld>
             <a:endParaRPr lang="en-US"/>
           </a:p>
@@ -822,7 +822,7 @@
           <a:p>
             <a:fld id="{78C97017-6FC3-485B-9764-EAC9E56C1D49}" type="datetimeFigureOut">
               <a:rPr lang="en-US" smtClean="0"/>
-              <a:t>4/11/2019</a:t>
+              <a:t>4/12/2019</a:t>
             </a:fld>
             <a:endParaRPr lang="en-US"/>
           </a:p>
@@ -1000,7 +1000,7 @@
           <a:p>
             <a:fld id="{78C97017-6FC3-485B-9764-EAC9E56C1D49}" type="datetimeFigureOut">
               <a:rPr lang="en-US" smtClean="0"/>
-              <a:t>4/11/2019</a:t>
+              <a:t>4/12/2019</a:t>
             </a:fld>
             <a:endParaRPr lang="en-US"/>
           </a:p>
@@ -1168,7 +1168,7 @@
           <a:p>
             <a:fld id="{78C97017-6FC3-485B-9764-EAC9E56C1D49}" type="datetimeFigureOut">
               <a:rPr lang="en-US" smtClean="0"/>
-              <a:t>4/11/2019</a:t>
+              <a:t>4/12/2019</a:t>
             </a:fld>
             <a:endParaRPr lang="en-US"/>
           </a:p>
@@ -1413,7 +1413,7 @@
           <a:p>
             <a:fld id="{78C97017-6FC3-485B-9764-EAC9E56C1D49}" type="datetimeFigureOut">
               <a:rPr lang="en-US" smtClean="0"/>
-              <a:t>4/11/2019</a:t>
+              <a:t>4/12/2019</a:t>
             </a:fld>
             <a:endParaRPr lang="en-US"/>
           </a:p>
@@ -1698,7 +1698,7 @@
           <a:p>
             <a:fld id="{78C97017-6FC3-485B-9764-EAC9E56C1D49}" type="datetimeFigureOut">
               <a:rPr lang="en-US" smtClean="0"/>
-              <a:t>4/11/2019</a:t>
+              <a:t>4/12/2019</a:t>
             </a:fld>
             <a:endParaRPr lang="en-US"/>
           </a:p>
@@ -2117,7 +2117,7 @@
           <a:p>
             <a:fld id="{78C97017-6FC3-485B-9764-EAC9E56C1D49}" type="datetimeFigureOut">
               <a:rPr lang="en-US" smtClean="0"/>
-              <a:t>4/11/2019</a:t>
+              <a:t>4/12/2019</a:t>
             </a:fld>
             <a:endParaRPr lang="en-US"/>
           </a:p>
@@ -2234,7 +2234,7 @@
           <a:p>
             <a:fld id="{78C97017-6FC3-485B-9764-EAC9E56C1D49}" type="datetimeFigureOut">
               <a:rPr lang="en-US" smtClean="0"/>
-              <a:t>4/11/2019</a:t>
+              <a:t>4/12/2019</a:t>
             </a:fld>
             <a:endParaRPr lang="en-US"/>
           </a:p>
@@ -2329,7 +2329,7 @@
           <a:p>
             <a:fld id="{78C97017-6FC3-485B-9764-EAC9E56C1D49}" type="datetimeFigureOut">
               <a:rPr lang="en-US" smtClean="0"/>
-              <a:t>4/11/2019</a:t>
+              <a:t>4/12/2019</a:t>
             </a:fld>
             <a:endParaRPr lang="en-US"/>
           </a:p>
@@ -2604,7 +2604,7 @@
           <a:p>
             <a:fld id="{78C97017-6FC3-485B-9764-EAC9E56C1D49}" type="datetimeFigureOut">
               <a:rPr lang="en-US" smtClean="0"/>
-              <a:t>4/11/2019</a:t>
+              <a:t>4/12/2019</a:t>
             </a:fld>
             <a:endParaRPr lang="en-US"/>
           </a:p>
@@ -2856,7 +2856,7 @@
           <a:p>
             <a:fld id="{78C97017-6FC3-485B-9764-EAC9E56C1D49}" type="datetimeFigureOut">
               <a:rPr lang="en-US" smtClean="0"/>
-              <a:t>4/11/2019</a:t>
+              <a:t>4/12/2019</a:t>
             </a:fld>
             <a:endParaRPr lang="en-US"/>
           </a:p>
@@ -3067,7 +3067,7 @@
           <a:p>
             <a:fld id="{78C97017-6FC3-485B-9764-EAC9E56C1D49}" type="datetimeFigureOut">
               <a:rPr lang="en-US" smtClean="0"/>
-              <a:t>4/11/2019</a:t>
+              <a:t>4/12/2019</a:t>
             </a:fld>
             <a:endParaRPr lang="en-US"/>
           </a:p>
@@ -5812,6 +5812,51 @@
           </a:p>
         </p:txBody>
       </p:sp>
+      <p:cxnSp>
+        <p:nvCxnSpPr>
+          <p:cNvPr id="52" name="Straight Connector 51">
+            <a:extLst>
+              <a:ext uri="{FF2B5EF4-FFF2-40B4-BE49-F238E27FC236}">
+                <a16:creationId xmlns:a16="http://schemas.microsoft.com/office/drawing/2014/main" id="{B6523843-0E3D-4970-AF02-9483F5C9C029}"/>
+              </a:ext>
+            </a:extLst>
+          </p:cNvPr>
+          <p:cNvCxnSpPr>
+            <a:cxnSpLocks/>
+          </p:cNvCxnSpPr>
+          <p:nvPr/>
+        </p:nvCxnSpPr>
+        <p:spPr>
+          <a:xfrm>
+            <a:off x="9928129" y="5572946"/>
+            <a:ext cx="0" cy="409274"/>
+          </a:xfrm>
+          <a:prstGeom prst="line">
+            <a:avLst/>
+          </a:prstGeom>
+          <a:ln w="19050">
+            <a:solidFill>
+              <a:srgbClr val="0070C0"/>
+            </a:solidFill>
+            <a:prstDash val="sysDash"/>
+          </a:ln>
+          <a:effectLst/>
+        </p:spPr>
+        <p:style>
+          <a:lnRef idx="1">
+            <a:schemeClr val="accent1"/>
+          </a:lnRef>
+          <a:fillRef idx="2">
+            <a:schemeClr val="accent1"/>
+          </a:fillRef>
+          <a:effectRef idx="1">
+            <a:schemeClr val="accent1"/>
+          </a:effectRef>
+          <a:fontRef idx="minor">
+            <a:schemeClr val="dk1"/>
+          </a:fontRef>
+        </p:style>
+      </p:cxnSp>
     </p:spTree>
     <p:extLst>
       <p:ext uri="{BB962C8B-B14F-4D97-AF65-F5344CB8AC3E}">

</xml_diff>

<commit_message>
fix deletebudgetsequencediagram in dev guide
</commit_message>
<xml_diff>
--- a/docs/diagrams/DeleteBudgetSequenceDiagram.pptx
+++ b/docs/diagrams/DeleteBudgetSequenceDiagram.pptx
@@ -208,7 +208,7 @@
           <a:p>
             <a:fld id="{F5CC4B3F-88C1-4FFA-B1B6-F41C21DC6924}" type="datetimeFigureOut">
               <a:rPr lang="en-US" smtClean="0"/>
-              <a:t>4/12/2019</a:t>
+              <a:t>4/13/2019</a:t>
             </a:fld>
             <a:endParaRPr lang="en-US"/>
           </a:p>
@@ -654,7 +654,7 @@
           <a:p>
             <a:fld id="{78C97017-6FC3-485B-9764-EAC9E56C1D49}" type="datetimeFigureOut">
               <a:rPr lang="en-US" smtClean="0"/>
-              <a:t>4/12/2019</a:t>
+              <a:t>4/13/2019</a:t>
             </a:fld>
             <a:endParaRPr lang="en-US"/>
           </a:p>
@@ -822,7 +822,7 @@
           <a:p>
             <a:fld id="{78C97017-6FC3-485B-9764-EAC9E56C1D49}" type="datetimeFigureOut">
               <a:rPr lang="en-US" smtClean="0"/>
-              <a:t>4/12/2019</a:t>
+              <a:t>4/13/2019</a:t>
             </a:fld>
             <a:endParaRPr lang="en-US"/>
           </a:p>
@@ -1000,7 +1000,7 @@
           <a:p>
             <a:fld id="{78C97017-6FC3-485B-9764-EAC9E56C1D49}" type="datetimeFigureOut">
               <a:rPr lang="en-US" smtClean="0"/>
-              <a:t>4/12/2019</a:t>
+              <a:t>4/13/2019</a:t>
             </a:fld>
             <a:endParaRPr lang="en-US"/>
           </a:p>
@@ -1168,7 +1168,7 @@
           <a:p>
             <a:fld id="{78C97017-6FC3-485B-9764-EAC9E56C1D49}" type="datetimeFigureOut">
               <a:rPr lang="en-US" smtClean="0"/>
-              <a:t>4/12/2019</a:t>
+              <a:t>4/13/2019</a:t>
             </a:fld>
             <a:endParaRPr lang="en-US"/>
           </a:p>
@@ -1413,7 +1413,7 @@
           <a:p>
             <a:fld id="{78C97017-6FC3-485B-9764-EAC9E56C1D49}" type="datetimeFigureOut">
               <a:rPr lang="en-US" smtClean="0"/>
-              <a:t>4/12/2019</a:t>
+              <a:t>4/13/2019</a:t>
             </a:fld>
             <a:endParaRPr lang="en-US"/>
           </a:p>
@@ -1698,7 +1698,7 @@
           <a:p>
             <a:fld id="{78C97017-6FC3-485B-9764-EAC9E56C1D49}" type="datetimeFigureOut">
               <a:rPr lang="en-US" smtClean="0"/>
-              <a:t>4/12/2019</a:t>
+              <a:t>4/13/2019</a:t>
             </a:fld>
             <a:endParaRPr lang="en-US"/>
           </a:p>
@@ -2117,7 +2117,7 @@
           <a:p>
             <a:fld id="{78C97017-6FC3-485B-9764-EAC9E56C1D49}" type="datetimeFigureOut">
               <a:rPr lang="en-US" smtClean="0"/>
-              <a:t>4/12/2019</a:t>
+              <a:t>4/13/2019</a:t>
             </a:fld>
             <a:endParaRPr lang="en-US"/>
           </a:p>
@@ -2234,7 +2234,7 @@
           <a:p>
             <a:fld id="{78C97017-6FC3-485B-9764-EAC9E56C1D49}" type="datetimeFigureOut">
               <a:rPr lang="en-US" smtClean="0"/>
-              <a:t>4/12/2019</a:t>
+              <a:t>4/13/2019</a:t>
             </a:fld>
             <a:endParaRPr lang="en-US"/>
           </a:p>
@@ -2329,7 +2329,7 @@
           <a:p>
             <a:fld id="{78C97017-6FC3-485B-9764-EAC9E56C1D49}" type="datetimeFigureOut">
               <a:rPr lang="en-US" smtClean="0"/>
-              <a:t>4/12/2019</a:t>
+              <a:t>4/13/2019</a:t>
             </a:fld>
             <a:endParaRPr lang="en-US"/>
           </a:p>
@@ -2604,7 +2604,7 @@
           <a:p>
             <a:fld id="{78C97017-6FC3-485B-9764-EAC9E56C1D49}" type="datetimeFigureOut">
               <a:rPr lang="en-US" smtClean="0"/>
-              <a:t>4/12/2019</a:t>
+              <a:t>4/13/2019</a:t>
             </a:fld>
             <a:endParaRPr lang="en-US"/>
           </a:p>
@@ -2856,7 +2856,7 @@
           <a:p>
             <a:fld id="{78C97017-6FC3-485B-9764-EAC9E56C1D49}" type="datetimeFigureOut">
               <a:rPr lang="en-US" smtClean="0"/>
-              <a:t>4/12/2019</a:t>
+              <a:t>4/13/2019</a:t>
             </a:fld>
             <a:endParaRPr lang="en-US"/>
           </a:p>
@@ -3067,7 +3067,7 @@
           <a:p>
             <a:fld id="{78C97017-6FC3-485B-9764-EAC9E56C1D49}" type="datetimeFigureOut">
               <a:rPr lang="en-US" smtClean="0"/>
-              <a:t>4/12/2019</a:t>
+              <a:t>4/13/2019</a:t>
             </a:fld>
             <a:endParaRPr lang="en-US"/>
           </a:p>
@@ -3444,10 +3444,10 @@
       </p:grpSpPr>
       <p:sp>
         <p:nvSpPr>
-          <p:cNvPr id="114" name="Rectangle 113">
+          <p:cNvPr id="53" name="Rectangle 65">
             <a:extLst>
               <a:ext uri="{FF2B5EF4-FFF2-40B4-BE49-F238E27FC236}">
-                <a16:creationId xmlns:a16="http://schemas.microsoft.com/office/drawing/2014/main" id="{D264DE18-CB9E-4D41-999D-151CCA738947}"/>
+                <a16:creationId xmlns:a16="http://schemas.microsoft.com/office/drawing/2014/main" id="{1E42F527-933D-4713-BBC8-B2801B09AEFE}"/>
               </a:ext>
             </a:extLst>
           </p:cNvPr>
@@ -3456,42 +3456,56 @@
         </p:nvSpPr>
         <p:spPr>
           <a:xfrm>
-            <a:off x="9775729" y="6885197"/>
-            <a:ext cx="152400" cy="276003"/>
-          </a:xfrm>
-          <a:prstGeom prst="rect">
-            <a:avLst/>
+            <a:off x="10121496" y="163018"/>
+            <a:ext cx="1256356" cy="6237782"/>
+          </a:xfrm>
+          <a:prstGeom prst="roundRect">
+            <a:avLst>
+              <a:gd name="adj" fmla="val 3484"/>
+            </a:avLst>
           </a:prstGeom>
           <a:solidFill>
-            <a:srgbClr val="0070C0"/>
+            <a:schemeClr val="accent4">
+              <a:lumMod val="20000"/>
+              <a:lumOff val="80000"/>
+            </a:schemeClr>
           </a:solidFill>
-          <a:ln>
-            <a:solidFill>
-              <a:srgbClr val="0070C0"/>
-            </a:solidFill>
+          <a:ln w="19050">
+            <a:noFill/>
           </a:ln>
           <a:effectLst/>
         </p:spPr>
         <p:style>
           <a:lnRef idx="1">
-            <a:schemeClr val="accent3"/>
+            <a:schemeClr val="accent2"/>
           </a:lnRef>
           <a:fillRef idx="2">
-            <a:schemeClr val="accent3"/>
+            <a:schemeClr val="accent2"/>
           </a:fillRef>
           <a:effectRef idx="1">
-            <a:schemeClr val="accent3"/>
+            <a:schemeClr val="accent2"/>
           </a:effectRef>
           <a:fontRef idx="minor">
             <a:schemeClr val="dk1"/>
           </a:fontRef>
         </p:style>
         <p:txBody>
-          <a:bodyPr rtlCol="0" anchor="ctr"/>
-          <a:lstStyle/>
-          <a:p>
-            <a:pPr algn="ctr"/>
-            <a:endParaRPr lang="en-SG" sz="1400"/>
+          <a:bodyPr rtlCol="0" anchor="t"/>
+          <a:lstStyle/>
+          <a:p>
+            <a:r>
+              <a:rPr lang="en-US" sz="1400" b="1" dirty="0">
+                <a:solidFill>
+                  <a:srgbClr val="7030A0"/>
+                </a:solidFill>
+              </a:rPr>
+              <a:t>Model</a:t>
+            </a:r>
+            <a:endParaRPr lang="en-SG" sz="1400" b="1" dirty="0">
+              <a:solidFill>
+                <a:srgbClr val="7030A0"/>
+              </a:solidFill>
+            </a:endParaRPr>
           </a:p>
         </p:txBody>
       </p:sp>
@@ -3504,7 +3518,7 @@
         <p:spPr>
           <a:xfrm>
             <a:off x="212122" y="163018"/>
-            <a:ext cx="9850013" cy="7233606"/>
+            <a:ext cx="9850013" cy="6272058"/>
           </a:xfrm>
           <a:prstGeom prst="roundRect">
             <a:avLst>
@@ -4411,47 +4425,6 @@
             <a:r>
               <a:rPr lang="en-US" sz="1600" dirty="0"/>
               <a:t>result</a:t>
-            </a:r>
-            <a:endParaRPr lang="en-US" dirty="0"/>
-          </a:p>
-        </p:txBody>
-      </p:sp>
-      <p:sp>
-        <p:nvSpPr>
-          <p:cNvPr id="93" name="TextBox 92"/>
-          <p:cNvSpPr txBox="1"/>
-          <p:nvPr/>
-        </p:nvSpPr>
-        <p:spPr>
-          <a:xfrm>
-            <a:off x="2724792" y="1905793"/>
-            <a:ext cx="220343" cy="246221"/>
-          </a:xfrm>
-          <a:prstGeom prst="rect">
-            <a:avLst/>
-          </a:prstGeom>
-          <a:noFill/>
-        </p:spPr>
-        <p:txBody>
-          <a:bodyPr wrap="square" lIns="0" tIns="0" rIns="0" bIns="0" rtlCol="0">
-            <a:spAutoFit/>
-          </a:bodyPr>
-          <a:lstStyle>
-            <a:defPPr>
-              <a:defRPr lang="en-US"/>
-            </a:defPPr>
-            <a:lvl1pPr algn="r">
-              <a:defRPr sz="1400">
-                <a:solidFill>
-                  <a:srgbClr val="0070C0"/>
-                </a:solidFill>
-              </a:defRPr>
-            </a:lvl1pPr>
-          </a:lstStyle>
-          <a:p>
-            <a:r>
-              <a:rPr lang="en-US" sz="1600" dirty="0"/>
-              <a:t>u</a:t>
             </a:r>
             <a:endParaRPr lang="en-US" dirty="0"/>
           </a:p>

</xml_diff>